<commit_message>
Added URL to presentation.
</commit_message>
<xml_diff>
--- a/anti-patterns.pptx
+++ b/anti-patterns.pptx
@@ -6342,6 +6342,47 @@
           </a:p>
         </p:txBody>
       </p:sp>
+      <p:sp>
+        <p:nvSpPr>
+          <p:cNvPr id="4" name="Rectangle 3">
+            <a:extLst>
+              <a:ext uri="{FF2B5EF4-FFF2-40B4-BE49-F238E27FC236}">
+                <a16:creationId xmlns:a16="http://schemas.microsoft.com/office/drawing/2014/main" id="{166E560C-0189-4CAD-B6C2-679D68A7E863}"/>
+              </a:ext>
+            </a:extLst>
+          </p:cNvPr>
+          <p:cNvSpPr/>
+          <p:nvPr/>
+        </p:nvSpPr>
+        <p:spPr>
+          <a:xfrm>
+            <a:off x="1507067" y="5980102"/>
+            <a:ext cx="10410506" cy="646331"/>
+          </a:xfrm>
+          <a:prstGeom prst="rect">
+            <a:avLst/>
+          </a:prstGeom>
+        </p:spPr>
+        <p:txBody>
+          <a:bodyPr wrap="square">
+            <a:spAutoFit/>
+          </a:bodyPr>
+          <a:lstStyle/>
+          <a:p>
+            <a:pPr algn="r"/>
+            <a:r>
+              <a:rPr lang="en-US" sz="3600" b="1" dirty="0">
+                <a:ln w="19050">
+                  <a:solidFill>
+                    <a:schemeClr val="bg1"/>
+                  </a:solidFill>
+                </a:ln>
+              </a:rPr>
+              <a:t>https://github.com/ericburcham/anti-patterns</a:t>
+            </a:r>
+          </a:p>
+        </p:txBody>
+      </p:sp>
     </p:spTree>
     <p:extLst>
       <p:ext uri="{BB962C8B-B14F-4D97-AF65-F5344CB8AC3E}">

</xml_diff>

<commit_message>
update presentation look and some of the wording
</commit_message>
<xml_diff>
--- a/anti-patterns.pptx
+++ b/anti-patterns.pptx
@@ -2,7 +2,7 @@
 <file path=ppt/presentation.xml><?xml version="1.0" encoding="utf-8"?>
 <p:presentation xmlns:a="http://schemas.openxmlformats.org/drawingml/2006/main" xmlns:r="http://schemas.openxmlformats.org/officeDocument/2006/relationships" xmlns:p="http://schemas.openxmlformats.org/presentationml/2006/main" saveSubsetFonts="1">
   <p:sldMasterIdLst>
-    <p:sldMasterId id="2147483677" r:id="rId1"/>
+    <p:sldMasterId id="2147483694" r:id="rId1"/>
   </p:sldMasterIdLst>
   <p:notesMasterIdLst>
     <p:notesMasterId r:id="rId38"/>
@@ -292,7 +292,7 @@
           <a:p>
             <a:fld id="{64B490A5-4E86-477E-AA35-5EBF646CB8CB}" type="datetimeFigureOut">
               <a:rPr lang="en-US" smtClean="0"/>
-              <a:t>10/18/2018</a:t>
+              <a:t>7/6/2022</a:t>
             </a:fld>
             <a:endParaRPr lang="en-US"/>
           </a:p>
@@ -559,6 +559,90 @@
 </p:notesMaster>
 </file>
 
+<file path=ppt/notesSlides/notesSlide1.xml><?xml version="1.0" encoding="utf-8"?>
+<p:notes xmlns:a="http://schemas.openxmlformats.org/drawingml/2006/main" xmlns:r="http://schemas.openxmlformats.org/officeDocument/2006/relationships" xmlns:p="http://schemas.openxmlformats.org/presentationml/2006/main">
+  <p:cSld>
+    <p:spTree>
+      <p:nvGrpSpPr>
+        <p:cNvPr id="1" name=""/>
+        <p:cNvGrpSpPr/>
+        <p:nvPr/>
+      </p:nvGrpSpPr>
+      <p:grpSpPr>
+        <a:xfrm>
+          <a:off x="0" y="0"/>
+          <a:ext cx="0" cy="0"/>
+          <a:chOff x="0" y="0"/>
+          <a:chExt cx="0" cy="0"/>
+        </a:xfrm>
+      </p:grpSpPr>
+      <p:sp>
+        <p:nvSpPr>
+          <p:cNvPr id="2" name="Slide Image Placeholder 1"/>
+          <p:cNvSpPr>
+            <a:spLocks noGrp="1" noRot="1" noChangeAspect="1"/>
+          </p:cNvSpPr>
+          <p:nvPr>
+            <p:ph type="sldImg"/>
+          </p:nvPr>
+        </p:nvSpPr>
+        <p:spPr/>
+      </p:sp>
+      <p:sp>
+        <p:nvSpPr>
+          <p:cNvPr id="3" name="Notes Placeholder 2"/>
+          <p:cNvSpPr>
+            <a:spLocks noGrp="1"/>
+          </p:cNvSpPr>
+          <p:nvPr>
+            <p:ph type="body" idx="1"/>
+          </p:nvPr>
+        </p:nvSpPr>
+        <p:spPr/>
+        <p:txBody>
+          <a:bodyPr/>
+          <a:lstStyle/>
+          <a:p>
+            <a:endParaRPr lang="en-US"/>
+          </a:p>
+        </p:txBody>
+      </p:sp>
+      <p:sp>
+        <p:nvSpPr>
+          <p:cNvPr id="4" name="Slide Number Placeholder 3"/>
+          <p:cNvSpPr>
+            <a:spLocks noGrp="1"/>
+          </p:cNvSpPr>
+          <p:nvPr>
+            <p:ph type="sldNum" sz="quarter" idx="5"/>
+          </p:nvPr>
+        </p:nvSpPr>
+        <p:spPr/>
+        <p:txBody>
+          <a:bodyPr/>
+          <a:lstStyle/>
+          <a:p>
+            <a:fld id="{3EA63362-A165-4503-83D0-57108A6798EB}" type="slidenum">
+              <a:rPr lang="en-US" smtClean="0"/>
+              <a:t>1</a:t>
+            </a:fld>
+            <a:endParaRPr lang="en-US"/>
+          </a:p>
+        </p:txBody>
+      </p:sp>
+    </p:spTree>
+    <p:extLst>
+      <p:ext uri="{BB962C8B-B14F-4D97-AF65-F5344CB8AC3E}">
+        <p14:creationId xmlns:p14="http://schemas.microsoft.com/office/powerpoint/2010/main" val="3426926854"/>
+      </p:ext>
+    </p:extLst>
+  </p:cSld>
+  <p:clrMapOvr>
+    <a:masterClrMapping/>
+  </p:clrMapOvr>
+</p:notes>
+</file>
+
 <file path=ppt/slideLayouts/slideLayout1.xml><?xml version="1.0" encoding="utf-8"?>
 <p:sldLayout xmlns:a="http://schemas.openxmlformats.org/drawingml/2006/main" xmlns:r="http://schemas.openxmlformats.org/officeDocument/2006/relationships" xmlns:p="http://schemas.openxmlformats.org/presentationml/2006/main" showMasterSp="0" type="title" preserve="1">
   <p:cSld name="Title Slide">
@@ -578,7 +662,7 @@
       </p:grpSpPr>
       <p:grpSp>
         <p:nvGrpSpPr>
-          <p:cNvPr id="16" name="Group 15"/>
+          <p:cNvPr id="8" name="Group 7"/>
           <p:cNvGrpSpPr/>
           <p:nvPr/>
         </p:nvGrpSpPr>
@@ -590,72 +674,9 @@
             <a:chExt cx="12192000" cy="6866467"/>
           </a:xfrm>
         </p:grpSpPr>
-        <p:sp>
-          <p:nvSpPr>
-            <p:cNvPr id="15" name="Freeform 14"/>
-            <p:cNvSpPr/>
-            <p:nvPr/>
-          </p:nvSpPr>
-          <p:spPr>
-            <a:xfrm>
-              <a:off x="0" y="-7862"/>
-              <a:ext cx="863600" cy="5698067"/>
-            </a:xfrm>
-            <a:custGeom>
-              <a:avLst/>
-              <a:gdLst/>
-              <a:ahLst/>
-              <a:cxnLst/>
-              <a:rect l="l" t="t" r="r" b="b"/>
-              <a:pathLst>
-                <a:path w="863600" h="5698067">
-                  <a:moveTo>
-                    <a:pt x="0" y="8467"/>
-                  </a:moveTo>
-                  <a:lnTo>
-                    <a:pt x="863600" y="0"/>
-                  </a:lnTo>
-                  <a:lnTo>
-                    <a:pt x="863600" y="16934"/>
-                  </a:lnTo>
-                  <a:lnTo>
-                    <a:pt x="0" y="5698067"/>
-                  </a:lnTo>
-                  <a:lnTo>
-                    <a:pt x="0" y="8467"/>
-                  </a:lnTo>
-                  <a:close/>
-                </a:path>
-              </a:pathLst>
-            </a:custGeom>
-            <a:solidFill>
-              <a:schemeClr val="accent1">
-                <a:alpha val="70000"/>
-              </a:schemeClr>
-            </a:solidFill>
-            <a:ln>
-              <a:noFill/>
-            </a:ln>
-            <a:effectLst/>
-          </p:spPr>
-          <p:style>
-            <a:lnRef idx="1">
-              <a:schemeClr val="accent1"/>
-            </a:lnRef>
-            <a:fillRef idx="3">
-              <a:schemeClr val="accent1"/>
-            </a:fillRef>
-            <a:effectRef idx="2">
-              <a:schemeClr val="accent1"/>
-            </a:effectRef>
-            <a:fontRef idx="minor">
-              <a:schemeClr val="lt1"/>
-            </a:fontRef>
-          </p:style>
-        </p:sp>
         <p:cxnSp>
           <p:nvCxnSpPr>
-            <p:cNvPr id="19" name="Straight Connector 18"/>
+            <p:cNvPr id="32" name="Straight Connector 31"/>
             <p:cNvCxnSpPr/>
             <p:nvPr/>
           </p:nvCxnSpPr>
@@ -669,8 +690,9 @@
             </a:prstGeom>
             <a:ln w="9525">
               <a:solidFill>
-                <a:schemeClr val="accent1">
-                  <a:alpha val="70000"/>
+                <a:schemeClr val="bg1">
+                  <a:lumMod val="85000"/>
+                  <a:lumOff val="15000"/>
                 </a:schemeClr>
               </a:solidFill>
             </a:ln>
@@ -692,7 +714,7 @@
         </p:cxnSp>
         <p:cxnSp>
           <p:nvCxnSpPr>
-            <p:cNvPr id="20" name="Straight Connector 19"/>
+            <p:cNvPr id="21" name="Straight Connector 20"/>
             <p:cNvCxnSpPr/>
             <p:nvPr/>
           </p:nvCxnSpPr>
@@ -706,8 +728,9 @@
             </a:prstGeom>
             <a:ln w="9525">
               <a:solidFill>
-                <a:schemeClr val="accent1">
-                  <a:alpha val="70000"/>
+                <a:schemeClr val="bg1">
+                  <a:lumMod val="85000"/>
+                  <a:lumOff val="15000"/>
                 </a:schemeClr>
               </a:solidFill>
             </a:ln>
@@ -729,7 +752,7 @@
         </p:cxnSp>
         <p:sp>
           <p:nvSpPr>
-            <p:cNvPr id="21" name="Rectangle 23"/>
+            <p:cNvPr id="24" name="Rectangle 23"/>
             <p:cNvSpPr/>
             <p:nvPr/>
           </p:nvSpPr>
@@ -767,7 +790,7 @@
             </a:custGeom>
             <a:solidFill>
               <a:schemeClr val="accent1">
-                <a:alpha val="36000"/>
+                <a:alpha val="30000"/>
               </a:schemeClr>
             </a:solidFill>
             <a:ln>
@@ -792,7 +815,7 @@
         </p:sp>
         <p:sp>
           <p:nvSpPr>
-            <p:cNvPr id="22" name="Rectangle 25"/>
+            <p:cNvPr id="26" name="Rectangle 25"/>
             <p:cNvSpPr/>
             <p:nvPr/>
           </p:nvSpPr>
@@ -855,7 +878,7 @@
         </p:sp>
         <p:sp>
           <p:nvSpPr>
-            <p:cNvPr id="23" name="Isosceles Triangle 22"/>
+            <p:cNvPr id="27" name="Isosceles Triangle 26"/>
             <p:cNvSpPr/>
             <p:nvPr/>
           </p:nvSpPr>
@@ -870,9 +893,8 @@
               </a:avLst>
             </a:prstGeom>
             <a:solidFill>
-              <a:schemeClr val="accent1">
-                <a:lumMod val="75000"/>
-                <a:alpha val="66000"/>
+              <a:schemeClr val="accent2">
+                <a:alpha val="72000"/>
               </a:schemeClr>
             </a:solidFill>
             <a:ln>
@@ -897,7 +919,7 @@
         </p:sp>
         <p:sp>
           <p:nvSpPr>
-            <p:cNvPr id="24" name="Rectangle 27"/>
+            <p:cNvPr id="28" name="Rectangle 27"/>
             <p:cNvSpPr/>
             <p:nvPr/>
           </p:nvSpPr>
@@ -934,9 +956,9 @@
               </a:pathLst>
             </a:custGeom>
             <a:solidFill>
-              <a:schemeClr val="accent1">
+              <a:schemeClr val="accent2">
                 <a:lumMod val="75000"/>
-                <a:alpha val="50000"/>
+                <a:alpha val="70000"/>
               </a:schemeClr>
             </a:solidFill>
             <a:ln>
@@ -961,7 +983,7 @@
         </p:sp>
         <p:sp>
           <p:nvSpPr>
-            <p:cNvPr id="25" name="Rectangle 28"/>
+            <p:cNvPr id="29" name="Rectangle 28"/>
             <p:cNvSpPr/>
             <p:nvPr/>
           </p:nvSpPr>
@@ -998,7 +1020,9 @@
               </a:pathLst>
             </a:custGeom>
             <a:solidFill>
-              <a:schemeClr val="accent2">
+              <a:schemeClr val="accent1">
+                <a:lumMod val="60000"/>
+                <a:lumOff val="40000"/>
                 <a:alpha val="70000"/>
               </a:schemeClr>
             </a:solidFill>
@@ -1024,7 +1048,7 @@
         </p:sp>
         <p:sp>
           <p:nvSpPr>
-            <p:cNvPr id="26" name="Rectangle 29"/>
+            <p:cNvPr id="30" name="Rectangle 29"/>
             <p:cNvSpPr/>
             <p:nvPr/>
           </p:nvSpPr>
@@ -1061,8 +1085,48 @@
               </a:pathLst>
             </a:custGeom>
             <a:solidFill>
-              <a:schemeClr val="accent2">
-                <a:lumMod val="75000"/>
+              <a:schemeClr val="accent1">
+                <a:alpha val="65000"/>
+              </a:schemeClr>
+            </a:solidFill>
+            <a:ln>
+              <a:noFill/>
+            </a:ln>
+            <a:effectLst/>
+          </p:spPr>
+          <p:style>
+            <a:lnRef idx="1">
+              <a:schemeClr val="accent1"/>
+            </a:lnRef>
+            <a:fillRef idx="3">
+              <a:schemeClr val="accent1"/>
+            </a:fillRef>
+            <a:effectRef idx="2">
+              <a:schemeClr val="accent1"/>
+            </a:effectRef>
+            <a:fontRef idx="minor">
+              <a:schemeClr val="lt1"/>
+            </a:fontRef>
+          </p:style>
+        </p:sp>
+        <p:sp>
+          <p:nvSpPr>
+            <p:cNvPr id="31" name="Isosceles Triangle 30"/>
+            <p:cNvSpPr/>
+            <p:nvPr/>
+          </p:nvSpPr>
+          <p:spPr>
+            <a:xfrm>
+              <a:off x="10371666" y="3589867"/>
+              <a:ext cx="1817159" cy="3268133"/>
+            </a:xfrm>
+            <a:prstGeom prst="triangle">
+              <a:avLst>
+                <a:gd name="adj" fmla="val 100000"/>
+              </a:avLst>
+            </a:prstGeom>
+            <a:solidFill>
+              <a:schemeClr val="accent1">
                 <a:alpha val="80000"/>
               </a:schemeClr>
             </a:solidFill>
@@ -1088,14 +1152,14 @@
         </p:sp>
         <p:sp>
           <p:nvSpPr>
-            <p:cNvPr id="27" name="Isosceles Triangle 26"/>
+            <p:cNvPr id="19" name="Isosceles Triangle 18"/>
             <p:cNvSpPr/>
             <p:nvPr/>
           </p:nvSpPr>
           <p:spPr>
-            <a:xfrm>
-              <a:off x="10371666" y="3589867"/>
-              <a:ext cx="1817159" cy="3268133"/>
+            <a:xfrm rot="10800000">
+              <a:off x="0" y="0"/>
+              <a:ext cx="842596" cy="5666154"/>
             </a:xfrm>
             <a:prstGeom prst="triangle">
               <a:avLst>
@@ -1104,8 +1168,7 @@
             </a:prstGeom>
             <a:solidFill>
               <a:schemeClr val="accent1">
-                <a:lumMod val="75000"/>
-                <a:alpha val="66000"/>
+                <a:alpha val="85000"/>
               </a:schemeClr>
             </a:solidFill>
             <a:ln>
@@ -1304,7 +1367,7 @@
           <a:p>
             <a:fld id="{342B5EF7-4FA1-4C3C-A90F-73C89C06ECCA}" type="datetimeFigureOut">
               <a:rPr lang="en-US" smtClean="0"/>
-              <a:t>10/18/2018</a:t>
+              <a:t>7/6/2022</a:t>
             </a:fld>
             <a:endParaRPr lang="en-US"/>
           </a:p>
@@ -1355,7 +1418,7 @@
     </p:spTree>
     <p:extLst>
       <p:ext uri="{BB962C8B-B14F-4D97-AF65-F5344CB8AC3E}">
-        <p14:creationId xmlns:p14="http://schemas.microsoft.com/office/powerpoint/2010/main" val="3715969647"/>
+        <p14:creationId xmlns:p14="http://schemas.microsoft.com/office/powerpoint/2010/main" val="221831617"/>
       </p:ext>
     </p:extLst>
   </p:cSld>
@@ -1533,7 +1596,7 @@
             <a:pPr lvl="0"/>
             <a:r>
               <a:rPr lang="en-US"/>
-              <a:t>Edit Master text styles</a:t>
+              <a:t>Click to edit Master text styles</a:t>
             </a:r>
           </a:p>
         </p:txBody>
@@ -1555,7 +1618,7 @@
           <a:p>
             <a:fld id="{342B5EF7-4FA1-4C3C-A90F-73C89C06ECCA}" type="datetimeFigureOut">
               <a:rPr lang="en-US" smtClean="0"/>
-              <a:t>10/18/2018</a:t>
+              <a:t>7/6/2022</a:t>
             </a:fld>
             <a:endParaRPr lang="en-US"/>
           </a:p>
@@ -1606,7 +1669,7 @@
     </p:spTree>
     <p:extLst>
       <p:ext uri="{BB962C8B-B14F-4D97-AF65-F5344CB8AC3E}">
-        <p14:creationId xmlns:p14="http://schemas.microsoft.com/office/powerpoint/2010/main" val="1081273258"/>
+        <p14:creationId xmlns:p14="http://schemas.microsoft.com/office/powerpoint/2010/main" val="1841641620"/>
       </p:ext>
     </p:extLst>
   </p:cSld>
@@ -1725,7 +1788,7 @@
             <a:pPr lvl="0"/>
             <a:r>
               <a:rPr lang="en-US"/>
-              <a:t>Edit Master text styles</a:t>
+              <a:t>Click to edit Master text styles</a:t>
             </a:r>
           </a:p>
         </p:txBody>
@@ -1847,7 +1910,7 @@
             <a:pPr lvl="0"/>
             <a:r>
               <a:rPr lang="en-US"/>
-              <a:t>Edit Master text styles</a:t>
+              <a:t>Click to edit Master text styles</a:t>
             </a:r>
           </a:p>
         </p:txBody>
@@ -1869,7 +1932,7 @@
           <a:p>
             <a:fld id="{342B5EF7-4FA1-4C3C-A90F-73C89C06ECCA}" type="datetimeFigureOut">
               <a:rPr lang="en-US" smtClean="0"/>
-              <a:t>10/18/2018</a:t>
+              <a:t>7/6/2022</a:t>
             </a:fld>
             <a:endParaRPr lang="en-US"/>
           </a:p>
@@ -1919,7 +1982,7 @@
       </p:sp>
       <p:sp>
         <p:nvSpPr>
-          <p:cNvPr id="24" name="TextBox 23"/>
+          <p:cNvPr id="20" name="TextBox 19"/>
           <p:cNvSpPr txBox="1"/>
           <p:nvPr/>
         </p:nvSpPr>
@@ -1945,10 +2008,7 @@
                   <a:noFill/>
                 </a:ln>
                 <a:solidFill>
-                  <a:schemeClr val="accent1">
-                    <a:lumMod val="60000"/>
-                    <a:lumOff val="40000"/>
-                  </a:schemeClr>
+                  <a:schemeClr val="accent1"/>
                 </a:solidFill>
                 <a:effectLst/>
                 <a:latin typeface="Arial"/>
@@ -1960,7 +2020,7 @@
       </p:sp>
       <p:sp>
         <p:nvSpPr>
-          <p:cNvPr id="25" name="TextBox 24"/>
+          <p:cNvPr id="22" name="TextBox 21"/>
           <p:cNvSpPr txBox="1"/>
           <p:nvPr/>
         </p:nvSpPr>
@@ -1986,10 +2046,7 @@
                   <a:noFill/>
                 </a:ln>
                 <a:solidFill>
-                  <a:schemeClr val="accent1">
-                    <a:lumMod val="60000"/>
-                    <a:lumOff val="40000"/>
-                  </a:schemeClr>
+                  <a:schemeClr val="accent1"/>
                 </a:solidFill>
                 <a:effectLst/>
                 <a:latin typeface="Arial"/>
@@ -2002,7 +2059,7 @@
     </p:spTree>
     <p:extLst>
       <p:ext uri="{BB962C8B-B14F-4D97-AF65-F5344CB8AC3E}">
-        <p14:creationId xmlns:p14="http://schemas.microsoft.com/office/powerpoint/2010/main" val="1671711747"/>
+        <p14:creationId xmlns:p14="http://schemas.microsoft.com/office/powerpoint/2010/main" val="1188054216"/>
       </p:ext>
     </p:extLst>
   </p:cSld>
@@ -2180,7 +2237,7 @@
             <a:pPr lvl="0"/>
             <a:r>
               <a:rPr lang="en-US"/>
-              <a:t>Edit Master text styles</a:t>
+              <a:t>Click to edit Master text styles</a:t>
             </a:r>
           </a:p>
         </p:txBody>
@@ -2202,7 +2259,7 @@
           <a:p>
             <a:fld id="{342B5EF7-4FA1-4C3C-A90F-73C89C06ECCA}" type="datetimeFigureOut">
               <a:rPr lang="en-US" smtClean="0"/>
-              <a:t>10/18/2018</a:t>
+              <a:t>7/6/2022</a:t>
             </a:fld>
             <a:endParaRPr lang="en-US"/>
           </a:p>
@@ -2253,7 +2310,7 @@
     </p:spTree>
     <p:extLst>
       <p:ext uri="{BB962C8B-B14F-4D97-AF65-F5344CB8AC3E}">
-        <p14:creationId xmlns:p14="http://schemas.microsoft.com/office/powerpoint/2010/main" val="1412276178"/>
+        <p14:creationId xmlns:p14="http://schemas.microsoft.com/office/powerpoint/2010/main" val="818628478"/>
       </p:ext>
     </p:extLst>
   </p:cSld>
@@ -2372,7 +2429,7 @@
             <a:pPr lvl="0"/>
             <a:r>
               <a:rPr lang="en-US"/>
-              <a:t>Edit Master text styles</a:t>
+              <a:t>Click to edit Master text styles</a:t>
             </a:r>
           </a:p>
         </p:txBody>
@@ -2494,7 +2551,7 @@
             <a:pPr lvl="0"/>
             <a:r>
               <a:rPr lang="en-US"/>
-              <a:t>Edit Master text styles</a:t>
+              <a:t>Click to edit Master text styles</a:t>
             </a:r>
           </a:p>
         </p:txBody>
@@ -2516,7 +2573,7 @@
           <a:p>
             <a:fld id="{342B5EF7-4FA1-4C3C-A90F-73C89C06ECCA}" type="datetimeFigureOut">
               <a:rPr lang="en-US" smtClean="0"/>
-              <a:t>10/18/2018</a:t>
+              <a:t>7/6/2022</a:t>
             </a:fld>
             <a:endParaRPr lang="en-US"/>
           </a:p>
@@ -2592,10 +2649,7 @@
                   <a:noFill/>
                 </a:ln>
                 <a:solidFill>
-                  <a:schemeClr val="accent1">
-                    <a:lumMod val="60000"/>
-                    <a:lumOff val="40000"/>
-                  </a:schemeClr>
+                  <a:schemeClr val="accent1"/>
                 </a:solidFill>
                 <a:effectLst/>
                 <a:latin typeface="Arial"/>
@@ -2633,10 +2687,7 @@
                   <a:noFill/>
                 </a:ln>
                 <a:solidFill>
-                  <a:schemeClr val="accent1">
-                    <a:lumMod val="60000"/>
-                    <a:lumOff val="40000"/>
-                  </a:schemeClr>
+                  <a:schemeClr val="accent1"/>
                 </a:solidFill>
                 <a:effectLst/>
                 <a:latin typeface="Arial"/>
@@ -2649,7 +2700,7 @@
     </p:spTree>
     <p:extLst>
       <p:ext uri="{BB962C8B-B14F-4D97-AF65-F5344CB8AC3E}">
-        <p14:creationId xmlns:p14="http://schemas.microsoft.com/office/powerpoint/2010/main" val="2754649162"/>
+        <p14:creationId xmlns:p14="http://schemas.microsoft.com/office/powerpoint/2010/main" val="867971335"/>
       </p:ext>
     </p:extLst>
   </p:cSld>
@@ -2765,7 +2816,7 @@
             <a:pPr lvl="0"/>
             <a:r>
               <a:rPr lang="en-US"/>
-              <a:t>Edit Master text styles</a:t>
+              <a:t>Click to edit Master text styles</a:t>
             </a:r>
           </a:p>
         </p:txBody>
@@ -2887,7 +2938,7 @@
             <a:pPr lvl="0"/>
             <a:r>
               <a:rPr lang="en-US"/>
-              <a:t>Edit Master text styles</a:t>
+              <a:t>Click to edit Master text styles</a:t>
             </a:r>
           </a:p>
         </p:txBody>
@@ -2909,7 +2960,7 @@
           <a:p>
             <a:fld id="{342B5EF7-4FA1-4C3C-A90F-73C89C06ECCA}" type="datetimeFigureOut">
               <a:rPr lang="en-US" smtClean="0"/>
-              <a:t>10/18/2018</a:t>
+              <a:t>7/6/2022</a:t>
             </a:fld>
             <a:endParaRPr lang="en-US"/>
           </a:p>
@@ -2960,7 +3011,7 @@
     </p:spTree>
     <p:extLst>
       <p:ext uri="{BB962C8B-B14F-4D97-AF65-F5344CB8AC3E}">
-        <p14:creationId xmlns:p14="http://schemas.microsoft.com/office/powerpoint/2010/main" val="4232936074"/>
+        <p14:creationId xmlns:p14="http://schemas.microsoft.com/office/powerpoint/2010/main" val="564163632"/>
       </p:ext>
     </p:extLst>
   </p:cSld>
@@ -3028,7 +3079,7 @@
             <a:pPr lvl="0"/>
             <a:r>
               <a:rPr lang="en-US"/>
-              <a:t>Edit Master text styles</a:t>
+              <a:t>Click to edit Master text styles</a:t>
             </a:r>
           </a:p>
           <a:p>
@@ -3079,7 +3130,7 @@
           <a:p>
             <a:fld id="{342B5EF7-4FA1-4C3C-A90F-73C89C06ECCA}" type="datetimeFigureOut">
               <a:rPr lang="en-US" smtClean="0"/>
-              <a:t>10/18/2018</a:t>
+              <a:t>7/6/2022</a:t>
             </a:fld>
             <a:endParaRPr lang="en-US"/>
           </a:p>
@@ -3130,7 +3181,7 @@
     </p:spTree>
     <p:extLst>
       <p:ext uri="{BB962C8B-B14F-4D97-AF65-F5344CB8AC3E}">
-        <p14:creationId xmlns:p14="http://schemas.microsoft.com/office/powerpoint/2010/main" val="1092804149"/>
+        <p14:creationId xmlns:p14="http://schemas.microsoft.com/office/powerpoint/2010/main" val="2468909824"/>
       </p:ext>
     </p:extLst>
   </p:cSld>
@@ -3208,7 +3259,7 @@
             <a:pPr lvl="0"/>
             <a:r>
               <a:rPr lang="en-US"/>
-              <a:t>Edit Master text styles</a:t>
+              <a:t>Click to edit Master text styles</a:t>
             </a:r>
           </a:p>
           <a:p>
@@ -3259,7 +3310,7 @@
           <a:p>
             <a:fld id="{342B5EF7-4FA1-4C3C-A90F-73C89C06ECCA}" type="datetimeFigureOut">
               <a:rPr lang="en-US" smtClean="0"/>
-              <a:t>10/18/2018</a:t>
+              <a:t>7/6/2022</a:t>
             </a:fld>
             <a:endParaRPr lang="en-US"/>
           </a:p>
@@ -3310,7 +3361,7 @@
     </p:spTree>
     <p:extLst>
       <p:ext uri="{BB962C8B-B14F-4D97-AF65-F5344CB8AC3E}">
-        <p14:creationId xmlns:p14="http://schemas.microsoft.com/office/powerpoint/2010/main" val="3566084901"/>
+        <p14:creationId xmlns:p14="http://schemas.microsoft.com/office/powerpoint/2010/main" val="2294029297"/>
       </p:ext>
     </p:extLst>
   </p:cSld>
@@ -3349,8 +3400,14 @@
         </p:nvSpPr>
         <p:spPr/>
         <p:txBody>
-          <a:bodyPr/>
-          <a:lstStyle/>
+          <a:bodyPr>
+            <a:normAutofit/>
+          </a:bodyPr>
+          <a:lstStyle>
+            <a:lvl1pPr>
+              <a:defRPr sz="3600"/>
+            </a:lvl1pPr>
+          </a:lstStyle>
           <a:p>
             <a:r>
               <a:rPr lang="en-US"/>
@@ -3378,7 +3435,7 @@
             <a:pPr lvl="0"/>
             <a:r>
               <a:rPr lang="en-US"/>
-              <a:t>Edit Master text styles</a:t>
+              <a:t>Click to edit Master text styles</a:t>
             </a:r>
           </a:p>
           <a:p>
@@ -3429,7 +3486,7 @@
           <a:p>
             <a:fld id="{342B5EF7-4FA1-4C3C-A90F-73C89C06ECCA}" type="datetimeFigureOut">
               <a:rPr lang="en-US" smtClean="0"/>
-              <a:t>10/18/2018</a:t>
+              <a:t>7/6/2022</a:t>
             </a:fld>
             <a:endParaRPr lang="en-US"/>
           </a:p>
@@ -3480,7 +3537,7 @@
     </p:spTree>
     <p:extLst>
       <p:ext uri="{BB962C8B-B14F-4D97-AF65-F5344CB8AC3E}">
-        <p14:creationId xmlns:p14="http://schemas.microsoft.com/office/powerpoint/2010/main" val="1650206724"/>
+        <p14:creationId xmlns:p14="http://schemas.microsoft.com/office/powerpoint/2010/main" val="723512197"/>
       </p:ext>
     </p:extLst>
   </p:cSld>
@@ -3654,7 +3711,7 @@
             <a:pPr lvl="0"/>
             <a:r>
               <a:rPr lang="en-US"/>
-              <a:t>Edit Master text styles</a:t>
+              <a:t>Click to edit Master text styles</a:t>
             </a:r>
           </a:p>
         </p:txBody>
@@ -3676,7 +3733,7 @@
           <a:p>
             <a:fld id="{342B5EF7-4FA1-4C3C-A90F-73C89C06ECCA}" type="datetimeFigureOut">
               <a:rPr lang="en-US" smtClean="0"/>
-              <a:t>10/18/2018</a:t>
+              <a:t>7/6/2022</a:t>
             </a:fld>
             <a:endParaRPr lang="en-US"/>
           </a:p>
@@ -3727,7 +3784,7 @@
     </p:spTree>
     <p:extLst>
       <p:ext uri="{BB962C8B-B14F-4D97-AF65-F5344CB8AC3E}">
-        <p14:creationId xmlns:p14="http://schemas.microsoft.com/office/powerpoint/2010/main" val="116537098"/>
+        <p14:creationId xmlns:p14="http://schemas.microsoft.com/office/powerpoint/2010/main" val="3736056211"/>
       </p:ext>
     </p:extLst>
   </p:cSld>
@@ -3800,7 +3857,7 @@
             <a:pPr lvl="0"/>
             <a:r>
               <a:rPr lang="en-US"/>
-              <a:t>Edit Master text styles</a:t>
+              <a:t>Click to edit Master text styles</a:t>
             </a:r>
           </a:p>
           <a:p>
@@ -3857,7 +3914,7 @@
             <a:pPr lvl="0"/>
             <a:r>
               <a:rPr lang="en-US"/>
-              <a:t>Edit Master text styles</a:t>
+              <a:t>Click to edit Master text styles</a:t>
             </a:r>
           </a:p>
           <a:p>
@@ -3908,7 +3965,7 @@
           <a:p>
             <a:fld id="{342B5EF7-4FA1-4C3C-A90F-73C89C06ECCA}" type="datetimeFigureOut">
               <a:rPr lang="en-US" smtClean="0"/>
-              <a:t>10/18/2018</a:t>
+              <a:t>7/6/2022</a:t>
             </a:fld>
             <a:endParaRPr lang="en-US"/>
           </a:p>
@@ -3959,7 +4016,7 @@
     </p:spTree>
     <p:extLst>
       <p:ext uri="{BB962C8B-B14F-4D97-AF65-F5344CB8AC3E}">
-        <p14:creationId xmlns:p14="http://schemas.microsoft.com/office/powerpoint/2010/main" val="2161294089"/>
+        <p14:creationId xmlns:p14="http://schemas.microsoft.com/office/powerpoint/2010/main" val="967782324"/>
       </p:ext>
     </p:extLst>
   </p:cSld>
@@ -4075,7 +4132,7 @@
             <a:pPr lvl="0"/>
             <a:r>
               <a:rPr lang="en-US"/>
-              <a:t>Edit Master text styles</a:t>
+              <a:t>Click to edit Master text styles</a:t>
             </a:r>
           </a:p>
         </p:txBody>
@@ -4105,7 +4162,7 @@
             <a:pPr lvl="0"/>
             <a:r>
               <a:rPr lang="en-US"/>
-              <a:t>Edit Master text styles</a:t>
+              <a:t>Click to edit Master text styles</a:t>
             </a:r>
           </a:p>
           <a:p>
@@ -4201,7 +4258,7 @@
             <a:pPr lvl="0"/>
             <a:r>
               <a:rPr lang="en-US"/>
-              <a:t>Edit Master text styles</a:t>
+              <a:t>Click to edit Master text styles</a:t>
             </a:r>
           </a:p>
         </p:txBody>
@@ -4231,7 +4288,7 @@
             <a:pPr lvl="0"/>
             <a:r>
               <a:rPr lang="en-US"/>
-              <a:t>Edit Master text styles</a:t>
+              <a:t>Click to edit Master text styles</a:t>
             </a:r>
           </a:p>
           <a:p>
@@ -4282,7 +4339,7 @@
           <a:p>
             <a:fld id="{342B5EF7-4FA1-4C3C-A90F-73C89C06ECCA}" type="datetimeFigureOut">
               <a:rPr lang="en-US" smtClean="0"/>
-              <a:t>10/18/2018</a:t>
+              <a:t>7/6/2022</a:t>
             </a:fld>
             <a:endParaRPr lang="en-US"/>
           </a:p>
@@ -4333,7 +4390,7 @@
     </p:spTree>
     <p:extLst>
       <p:ext uri="{BB962C8B-B14F-4D97-AF65-F5344CB8AC3E}">
-        <p14:creationId xmlns:p14="http://schemas.microsoft.com/office/powerpoint/2010/main" val="547234947"/>
+        <p14:creationId xmlns:p14="http://schemas.microsoft.com/office/powerpoint/2010/main" val="1275420353"/>
       </p:ext>
     </p:extLst>
   </p:cSld>
@@ -4405,7 +4462,7 @@
           <a:p>
             <a:fld id="{342B5EF7-4FA1-4C3C-A90F-73C89C06ECCA}" type="datetimeFigureOut">
               <a:rPr lang="en-US" smtClean="0"/>
-              <a:t>10/18/2018</a:t>
+              <a:t>7/6/2022</a:t>
             </a:fld>
             <a:endParaRPr lang="en-US"/>
           </a:p>
@@ -4456,7 +4513,7 @@
     </p:spTree>
     <p:extLst>
       <p:ext uri="{BB962C8B-B14F-4D97-AF65-F5344CB8AC3E}">
-        <p14:creationId xmlns:p14="http://schemas.microsoft.com/office/powerpoint/2010/main" val="1784058333"/>
+        <p14:creationId xmlns:p14="http://schemas.microsoft.com/office/powerpoint/2010/main" val="4003557929"/>
       </p:ext>
     </p:extLst>
   </p:cSld>
@@ -4500,7 +4557,7 @@
           <a:p>
             <a:fld id="{342B5EF7-4FA1-4C3C-A90F-73C89C06ECCA}" type="datetimeFigureOut">
               <a:rPr lang="en-US" smtClean="0"/>
-              <a:t>10/18/2018</a:t>
+              <a:t>7/6/2022</a:t>
             </a:fld>
             <a:endParaRPr lang="en-US"/>
           </a:p>
@@ -4551,7 +4608,7 @@
     </p:spTree>
     <p:extLst>
       <p:ext uri="{BB962C8B-B14F-4D97-AF65-F5344CB8AC3E}">
-        <p14:creationId xmlns:p14="http://schemas.microsoft.com/office/powerpoint/2010/main" val="2813533108"/>
+        <p14:creationId xmlns:p14="http://schemas.microsoft.com/office/powerpoint/2010/main" val="3897522378"/>
       </p:ext>
     </p:extLst>
   </p:cSld>
@@ -4637,7 +4694,7 @@
             <a:pPr lvl="0"/>
             <a:r>
               <a:rPr lang="en-US"/>
-              <a:t>Edit Master text styles</a:t>
+              <a:t>Click to edit Master text styles</a:t>
             </a:r>
           </a:p>
           <a:p>
@@ -4733,7 +4790,7 @@
             <a:pPr lvl="0"/>
             <a:r>
               <a:rPr lang="en-US"/>
-              <a:t>Edit Master text styles</a:t>
+              <a:t>Click to edit Master text styles</a:t>
             </a:r>
           </a:p>
         </p:txBody>
@@ -4755,7 +4812,7 @@
           <a:p>
             <a:fld id="{342B5EF7-4FA1-4C3C-A90F-73C89C06ECCA}" type="datetimeFigureOut">
               <a:rPr lang="en-US" smtClean="0"/>
-              <a:t>10/18/2018</a:t>
+              <a:t>7/6/2022</a:t>
             </a:fld>
             <a:endParaRPr lang="en-US"/>
           </a:p>
@@ -4806,7 +4863,7 @@
     </p:spTree>
     <p:extLst>
       <p:ext uri="{BB962C8B-B14F-4D97-AF65-F5344CB8AC3E}">
-        <p14:creationId xmlns:p14="http://schemas.microsoft.com/office/powerpoint/2010/main" val="1775894714"/>
+        <p14:creationId xmlns:p14="http://schemas.microsoft.com/office/powerpoint/2010/main" val="4265905442"/>
       </p:ext>
     </p:extLst>
   </p:cSld>
@@ -4996,8 +5053,31 @@
             <a:pPr lvl="0"/>
             <a:r>
               <a:rPr lang="en-US"/>
-              <a:t>Edit Master text styles</a:t>
-            </a:r>
+              <a:t>Click to edit Master text styles</a:t>
+            </a:r>
+          </a:p>
+        </p:txBody>
+      </p:sp>
+      <p:sp>
+        <p:nvSpPr>
+          <p:cNvPr id="5" name="Date Placeholder 4"/>
+          <p:cNvSpPr>
+            <a:spLocks noGrp="1"/>
+          </p:cNvSpPr>
+          <p:nvPr>
+            <p:ph type="dt" sz="half" idx="10"/>
+          </p:nvPr>
+        </p:nvSpPr>
+        <p:spPr/>
+        <p:txBody>
+          <a:bodyPr/>
+          <a:lstStyle/>
+          <a:p>
+            <a:fld id="{342B5EF7-4FA1-4C3C-A90F-73C89C06ECCA}" type="datetimeFigureOut">
+              <a:rPr lang="en-US" smtClean="0"/>
+              <a:t>7/6/2022</a:t>
+            </a:fld>
+            <a:endParaRPr lang="en-US"/>
           </a:p>
         </p:txBody>
       </p:sp>
@@ -5043,33 +5123,10 @@
           </a:p>
         </p:txBody>
       </p:sp>
-      <p:sp>
-        <p:nvSpPr>
-          <p:cNvPr id="5" name="Date Placeholder 4"/>
-          <p:cNvSpPr>
-            <a:spLocks noGrp="1"/>
-          </p:cNvSpPr>
-          <p:nvPr>
-            <p:ph type="dt" sz="half" idx="10"/>
-          </p:nvPr>
-        </p:nvSpPr>
-        <p:spPr/>
-        <p:txBody>
-          <a:bodyPr/>
-          <a:lstStyle/>
-          <a:p>
-            <a:fld id="{342B5EF7-4FA1-4C3C-A90F-73C89C06ECCA}" type="datetimeFigureOut">
-              <a:rPr lang="en-US" smtClean="0"/>
-              <a:t>10/18/2018</a:t>
-            </a:fld>
-            <a:endParaRPr lang="en-US"/>
-          </a:p>
-        </p:txBody>
-      </p:sp>
     </p:spTree>
     <p:extLst>
       <p:ext uri="{BB962C8B-B14F-4D97-AF65-F5344CB8AC3E}">
-        <p14:creationId xmlns:p14="http://schemas.microsoft.com/office/powerpoint/2010/main" val="2054927191"/>
+        <p14:creationId xmlns:p14="http://schemas.microsoft.com/office/powerpoint/2010/main" val="1506557861"/>
       </p:ext>
     </p:extLst>
   </p:cSld>
@@ -5084,7 +5141,7 @@
   <p:cSld>
     <p:bg>
       <p:bgRef idx="1001">
-        <a:schemeClr val="bg1"/>
+        <a:schemeClr val="bg2"/>
       </p:bgRef>
     </p:bg>
     <p:spTree>
@@ -5103,7 +5160,7 @@
       </p:grpSpPr>
       <p:grpSp>
         <p:nvGrpSpPr>
-          <p:cNvPr id="44" name="Group 43"/>
+          <p:cNvPr id="8" name="Group 7"/>
           <p:cNvGrpSpPr/>
           <p:nvPr/>
         </p:nvGrpSpPr>
@@ -5131,8 +5188,9 @@
             </a:prstGeom>
             <a:ln w="9525">
               <a:solidFill>
-                <a:schemeClr val="accent1">
-                  <a:alpha val="70000"/>
+                <a:schemeClr val="bg1">
+                  <a:lumMod val="85000"/>
+                  <a:lumOff val="15000"/>
                 </a:schemeClr>
               </a:solidFill>
             </a:ln>
@@ -5168,8 +5226,9 @@
             </a:prstGeom>
             <a:ln w="9525">
               <a:solidFill>
-                <a:schemeClr val="accent1">
-                  <a:alpha val="70000"/>
+                <a:schemeClr val="bg1">
+                  <a:lumMod val="85000"/>
+                  <a:lumOff val="15000"/>
                 </a:schemeClr>
               </a:solidFill>
             </a:ln>
@@ -5229,7 +5288,7 @@
             </a:custGeom>
             <a:solidFill>
               <a:schemeClr val="accent1">
-                <a:alpha val="36000"/>
+                <a:alpha val="30000"/>
               </a:schemeClr>
             </a:solidFill>
             <a:ln>
@@ -5332,9 +5391,8 @@
               </a:avLst>
             </a:prstGeom>
             <a:solidFill>
-              <a:schemeClr val="accent1">
-                <a:lumMod val="75000"/>
-                <a:alpha val="66000"/>
+              <a:schemeClr val="accent2">
+                <a:alpha val="72000"/>
               </a:schemeClr>
             </a:solidFill>
             <a:ln>
@@ -5396,9 +5454,9 @@
               </a:pathLst>
             </a:custGeom>
             <a:solidFill>
-              <a:schemeClr val="accent1">
+              <a:schemeClr val="accent2">
                 <a:lumMod val="75000"/>
-                <a:alpha val="50000"/>
+                <a:alpha val="70000"/>
               </a:schemeClr>
             </a:solidFill>
             <a:ln>
@@ -5460,7 +5518,9 @@
               </a:pathLst>
             </a:custGeom>
             <a:solidFill>
-              <a:schemeClr val="accent2">
+              <a:schemeClr val="accent1">
+                <a:lumMod val="60000"/>
+                <a:lumOff val="40000"/>
                 <a:alpha val="70000"/>
               </a:schemeClr>
             </a:solidFill>
@@ -5523,9 +5583,8 @@
               </a:pathLst>
             </a:custGeom>
             <a:solidFill>
-              <a:schemeClr val="accent2">
-                <a:lumMod val="75000"/>
-                <a:alpha val="80000"/>
+              <a:schemeClr val="accent1">
+                <a:alpha val="65000"/>
               </a:schemeClr>
             </a:solidFill>
             <a:ln>
@@ -5566,8 +5625,7 @@
             </a:prstGeom>
             <a:solidFill>
               <a:schemeClr val="accent1">
-                <a:lumMod val="75000"/>
-                <a:alpha val="66000"/>
+                <a:alpha val="80000"/>
               </a:schemeClr>
             </a:solidFill>
             <a:ln>
@@ -5592,7 +5650,7 @@
         </p:sp>
         <p:sp>
           <p:nvSpPr>
-            <p:cNvPr id="19" name="Isosceles Triangle 18"/>
+            <p:cNvPr id="29" name="Isosceles Triangle 28"/>
             <p:cNvSpPr/>
             <p:nvPr/>
           </p:nvSpPr>
@@ -5608,7 +5666,7 @@
             </a:prstGeom>
             <a:solidFill>
               <a:schemeClr val="accent1">
-                <a:alpha val="70000"/>
+                <a:alpha val="85000"/>
               </a:schemeClr>
             </a:solidFill>
             <a:ln>
@@ -5693,7 +5751,7 @@
             <a:pPr lvl="0"/>
             <a:r>
               <a:rPr lang="en-US"/>
-              <a:t>Edit Master text styles</a:t>
+              <a:t>Click to edit Master text styles</a:t>
             </a:r>
           </a:p>
           <a:p>
@@ -5762,7 +5820,7 @@
           <a:p>
             <a:fld id="{342B5EF7-4FA1-4C3C-A90F-73C89C06ECCA}" type="datetimeFigureOut">
               <a:rPr lang="en-US" smtClean="0"/>
-              <a:t>10/18/2018</a:t>
+              <a:t>7/6/2022</a:t>
             </a:fld>
             <a:endParaRPr lang="en-US"/>
           </a:p>
@@ -5847,28 +5905,28 @@
     </p:spTree>
     <p:extLst>
       <p:ext uri="{BB962C8B-B14F-4D97-AF65-F5344CB8AC3E}">
-        <p14:creationId xmlns:p14="http://schemas.microsoft.com/office/powerpoint/2010/main" val="1778718891"/>
+        <p14:creationId xmlns:p14="http://schemas.microsoft.com/office/powerpoint/2010/main" val="4125457341"/>
       </p:ext>
     </p:extLst>
   </p:cSld>
-  <p:clrMap bg1="lt1" tx1="dk1" bg2="lt2" tx2="dk2" accent1="accent1" accent2="accent2" accent3="accent3" accent4="accent4" accent5="accent5" accent6="accent6" hlink="hlink" folHlink="folHlink"/>
+  <p:clrMap bg1="dk1" tx1="lt1" bg2="dk2" tx2="lt2" accent1="accent1" accent2="accent2" accent3="accent3" accent4="accent4" accent5="accent5" accent6="accent6" hlink="hlink" folHlink="folHlink"/>
   <p:sldLayoutIdLst>
-    <p:sldLayoutId id="2147483678" r:id="rId1"/>
-    <p:sldLayoutId id="2147483679" r:id="rId2"/>
-    <p:sldLayoutId id="2147483680" r:id="rId3"/>
-    <p:sldLayoutId id="2147483681" r:id="rId4"/>
-    <p:sldLayoutId id="2147483682" r:id="rId5"/>
-    <p:sldLayoutId id="2147483683" r:id="rId6"/>
-    <p:sldLayoutId id="2147483684" r:id="rId7"/>
-    <p:sldLayoutId id="2147483685" r:id="rId8"/>
-    <p:sldLayoutId id="2147483686" r:id="rId9"/>
-    <p:sldLayoutId id="2147483687" r:id="rId10"/>
-    <p:sldLayoutId id="2147483688" r:id="rId11"/>
-    <p:sldLayoutId id="2147483689" r:id="rId12"/>
-    <p:sldLayoutId id="2147483690" r:id="rId13"/>
-    <p:sldLayoutId id="2147483691" r:id="rId14"/>
-    <p:sldLayoutId id="2147483692" r:id="rId15"/>
-    <p:sldLayoutId id="2147483693" r:id="rId16"/>
+    <p:sldLayoutId id="2147483695" r:id="rId1"/>
+    <p:sldLayoutId id="2147483696" r:id="rId2"/>
+    <p:sldLayoutId id="2147483697" r:id="rId3"/>
+    <p:sldLayoutId id="2147483698" r:id="rId4"/>
+    <p:sldLayoutId id="2147483699" r:id="rId5"/>
+    <p:sldLayoutId id="2147483700" r:id="rId6"/>
+    <p:sldLayoutId id="2147483701" r:id="rId7"/>
+    <p:sldLayoutId id="2147483702" r:id="rId8"/>
+    <p:sldLayoutId id="2147483703" r:id="rId9"/>
+    <p:sldLayoutId id="2147483704" r:id="rId10"/>
+    <p:sldLayoutId id="2147483705" r:id="rId11"/>
+    <p:sldLayoutId id="2147483706" r:id="rId12"/>
+    <p:sldLayoutId id="2147483707" r:id="rId13"/>
+    <p:sldLayoutId id="2147483708" r:id="rId14"/>
+    <p:sldLayoutId id="2147483709" r:id="rId15"/>
+    <p:sldLayoutId id="2147483710" r:id="rId16"/>
   </p:sldLayoutIdLst>
   <p:txStyles>
     <p:titleStyle>
@@ -6460,7 +6518,7 @@
         <p:spPr/>
         <p:txBody>
           <a:bodyPr>
-            <a:normAutofit/>
+            <a:normAutofit lnSpcReduction="10000"/>
           </a:bodyPr>
           <a:lstStyle/>
           <a:p>
@@ -6473,7 +6531,7 @@
             </a:r>
             <a:r>
               <a:rPr lang="en-US" dirty="0"/>
-              <a:t>:  A manager who only interacts when there is a problem, flies in, makes a lot of noise, dumps on everyone, then flies out.</a:t>
+              <a:t>:  A manager who only interacts when there is a problem, flies in, makes a lot of noise, squawks at everyone, then flies out.</a:t>
             </a:r>
           </a:p>
           <a:p>
@@ -6511,7 +6569,7 @@
             </a:r>
             <a:r>
               <a:rPr lang="en-US" dirty="0"/>
-              <a:t>:  Exercise patience.  Ensure they have the necessary information, even if doing so is uncomfortable.  Remember, nobody can make decisions with information they don’t have.  Be proactive; anticipate problems and deal with them before your boss notices.  When you need a decision, take your boss the information they need </a:t>
+              <a:t>:  Manage upwards. Ensure they have the necessary information, even if doing so is uncomfortable. Exercise patience. Remember, nobody can make decisions with information they don’t have.  Be proactive; anticipate problems and deal with them before your boss notices.  When you need a decision, take your boss the information they need </a:t>
             </a:r>
             <a:r>
               <a:rPr lang="en-US" i="1" dirty="0"/>
@@ -6975,7 +7033,7 @@
             </a:r>
             <a:r>
               <a:rPr lang="en-US" dirty="0"/>
-              <a:t>:  A person becomes so strongly identified with their job or role that it becomes difficult to transition to other roles.</a:t>
+              <a:t>:  A person becomes so strongly identified with their job or role that it becomes difficult to transition to other roles, including those which may better benefit the organization.</a:t>
             </a:r>
           </a:p>
           <a:p>
@@ -7485,7 +7543,7 @@
             </a:r>
             <a:r>
               <a:rPr lang="en-US" dirty="0"/>
-              <a:t>:  Operating on the edge – how do you draw the line between high performance and a death march?</a:t>
+              <a:t>:  Operating on the edge – how do you draw the line between maximum team performance and a death march?</a:t>
             </a:r>
           </a:p>
           <a:p>
@@ -9233,7 +9291,7 @@
             </a:pPr>
             <a:r>
               <a:rPr lang="en-US" b="1" dirty="0"/>
-              <a:t>Solution</a:t>
+              <a:t>Discussion Point</a:t>
             </a:r>
             <a:r>
               <a:rPr lang="en-US" dirty="0"/>
@@ -9245,7 +9303,26 @@
             </a:r>
             <a:r>
               <a:rPr lang="en-US" dirty="0"/>
-              <a:t> bugs, and teams that run this way are in for all kinds of problems.  Stand up for yourself.  Insist that work be filed correctly.</a:t>
+              <a:t> bugs, and teams that run this way are in for all kinds of problems, especially with morale.</a:t>
+            </a:r>
+          </a:p>
+          <a:p>
+            <a:pPr marL="0" indent="0">
+              <a:buNone/>
+            </a:pPr>
+            <a:endParaRPr lang="en-US" dirty="0"/>
+          </a:p>
+          <a:p>
+            <a:pPr marL="0" indent="0">
+              <a:buNone/>
+            </a:pPr>
+            <a:r>
+              <a:rPr lang="en-US" b="1" dirty="0"/>
+              <a:t>Solution</a:t>
+            </a:r>
+            <a:r>
+              <a:rPr lang="en-US" dirty="0"/>
+              <a:t>: Stand up for yourself.  Insist that work be filed correctly.</a:t>
             </a:r>
           </a:p>
         </p:txBody>
@@ -9548,6 +9625,109 @@
                                           <p:spTgt spid="3">
                                             <p:txEl>
                                               <p:pRg st="4" end="4"/>
+                                            </p:txEl>
+                                          </p:spTgt>
+                                        </p:tgtEl>
+                                        <p:attrNameLst>
+                                          <p:attrName>ppt_y</p:attrName>
+                                        </p:attrNameLst>
+                                      </p:cBhvr>
+                                      <p:tavLst>
+                                        <p:tav tm="0">
+                                          <p:val>
+                                            <p:strVal val="1+#ppt_h/2"/>
+                                          </p:val>
+                                        </p:tav>
+                                        <p:tav tm="100000">
+                                          <p:val>
+                                            <p:strVal val="#ppt_y"/>
+                                          </p:val>
+                                        </p:tav>
+                                      </p:tavLst>
+                                    </p:anim>
+                                  </p:childTnLst>
+                                </p:cTn>
+                              </p:par>
+                            </p:childTnLst>
+                          </p:cTn>
+                        </p:par>
+                      </p:childTnLst>
+                    </p:cTn>
+                  </p:par>
+                  <p:par>
+                    <p:cTn id="21" fill="hold">
+                      <p:stCondLst>
+                        <p:cond delay="indefinite"/>
+                      </p:stCondLst>
+                      <p:childTnLst>
+                        <p:par>
+                          <p:cTn id="22" fill="hold">
+                            <p:stCondLst>
+                              <p:cond delay="0"/>
+                            </p:stCondLst>
+                            <p:childTnLst>
+                              <p:par>
+                                <p:cTn id="23" presetID="2" presetClass="entr" presetSubtype="4" fill="hold" grpId="0" nodeType="clickEffect">
+                                  <p:stCondLst>
+                                    <p:cond delay="0"/>
+                                  </p:stCondLst>
+                                  <p:childTnLst>
+                                    <p:set>
+                                      <p:cBhvr>
+                                        <p:cTn id="24" dur="1" fill="hold">
+                                          <p:stCondLst>
+                                            <p:cond delay="0"/>
+                                          </p:stCondLst>
+                                        </p:cTn>
+                                        <p:tgtEl>
+                                          <p:spTgt spid="3">
+                                            <p:txEl>
+                                              <p:pRg st="6" end="6"/>
+                                            </p:txEl>
+                                          </p:spTgt>
+                                        </p:tgtEl>
+                                        <p:attrNameLst>
+                                          <p:attrName>style.visibility</p:attrName>
+                                        </p:attrNameLst>
+                                      </p:cBhvr>
+                                      <p:to>
+                                        <p:strVal val="visible"/>
+                                      </p:to>
+                                    </p:set>
+                                    <p:anim calcmode="lin" valueType="num">
+                                      <p:cBhvr additive="base">
+                                        <p:cTn id="25" dur="500" fill="hold"/>
+                                        <p:tgtEl>
+                                          <p:spTgt spid="3">
+                                            <p:txEl>
+                                              <p:pRg st="6" end="6"/>
+                                            </p:txEl>
+                                          </p:spTgt>
+                                        </p:tgtEl>
+                                        <p:attrNameLst>
+                                          <p:attrName>ppt_x</p:attrName>
+                                        </p:attrNameLst>
+                                      </p:cBhvr>
+                                      <p:tavLst>
+                                        <p:tav tm="0">
+                                          <p:val>
+                                            <p:strVal val="#ppt_x"/>
+                                          </p:val>
+                                        </p:tav>
+                                        <p:tav tm="100000">
+                                          <p:val>
+                                            <p:strVal val="#ppt_x"/>
+                                          </p:val>
+                                        </p:tav>
+                                      </p:tavLst>
+                                    </p:anim>
+                                    <p:anim calcmode="lin" valueType="num">
+                                      <p:cBhvr additive="base">
+                                        <p:cTn id="26" dur="500" fill="hold"/>
+                                        <p:tgtEl>
+                                          <p:spTgt spid="3">
+                                            <p:txEl>
+                                              <p:pRg st="6" end="6"/>
                                             </p:txEl>
                                           </p:spTgt>
                                         </p:tgtEl>
@@ -10222,14 +10402,16 @@
             <a:r>
               <a:rPr lang="en-US" sz="2400" dirty="0">
                 <a:solidFill>
-                  <a:schemeClr val="bg2">
-                    <a:lumMod val="75000"/>
-                  </a:schemeClr>
+                  <a:srgbClr val="0070C0"/>
                 </a:solidFill>
               </a:rPr>
-              <a:t>Eric’s Favorite</a:t>
-            </a:r>
-            <a:endParaRPr lang="en-US" dirty="0"/>
+              <a:t>* Eric’s Favorite</a:t>
+            </a:r>
+            <a:endParaRPr lang="en-US" dirty="0">
+              <a:solidFill>
+                <a:srgbClr val="0070C0"/>
+              </a:solidFill>
+            </a:endParaRPr>
           </a:p>
         </p:txBody>
       </p:sp>
@@ -10303,7 +10485,7 @@
             </a:r>
             <a:r>
               <a:rPr lang="en-US" dirty="0"/>
-              <a:t>:  Keep an open mind, and respect others enough to understand their solutions before proposing your own.  Keep “good enough” in mind.  A less than ideal solution today sometimes trumps a clever one tomorrow.</a:t>
+              <a:t>:  Keep an open mind, and respect others enough to understand their solutions before proposing your own.  Keep “good enough” in mind.  A less than ideal solution today often trumps a clever or perfect one tomorrow.</a:t>
             </a:r>
           </a:p>
         </p:txBody>
@@ -10664,7 +10846,7 @@
 </file>
 
 <file path=ppt/slides/slide19.xml><?xml version="1.0" encoding="utf-8"?>
-<p:sld xmlns:a="http://schemas.openxmlformats.org/drawingml/2006/main" xmlns:r="http://schemas.openxmlformats.org/officeDocument/2006/relationships" xmlns:p="http://schemas.openxmlformats.org/presentationml/2006/main" show="0">
+<p:sld xmlns:a="http://schemas.openxmlformats.org/drawingml/2006/main" xmlns:r="http://schemas.openxmlformats.org/officeDocument/2006/relationships" xmlns:p="http://schemas.openxmlformats.org/presentationml/2006/main">
   <p:cSld>
     <p:spTree>
       <p:nvGrpSpPr>
@@ -19756,7 +19938,7 @@
         <p:spPr/>
         <p:txBody>
           <a:bodyPr>
-            <a:normAutofit fontScale="92500" lnSpcReduction="10000"/>
+            <a:normAutofit lnSpcReduction="10000"/>
           </a:bodyPr>
           <a:lstStyle/>
           <a:p>
@@ -19765,9 +19947,12 @@
             </a:pPr>
             <a:r>
               <a:rPr lang="en-US" b="1" dirty="0"/>
-              <a:t>Jackson’s Rules of Optimization</a:t>
-            </a:r>
-            <a:endParaRPr lang="en-US" dirty="0"/>
+              <a:t>Definition</a:t>
+            </a:r>
+            <a:r>
+              <a:rPr lang="en-US" dirty="0"/>
+              <a:t>:  Coding early on for perceived efficiency, sacrificing good design, maintainability, and (often) even real-world efficiency.</a:t>
+            </a:r>
           </a:p>
           <a:p>
             <a:pPr marL="0" indent="0">
@@ -19781,11 +19966,11 @@
             </a:pPr>
             <a:r>
               <a:rPr lang="en-US" b="1" dirty="0"/>
-              <a:t>Definition</a:t>
+              <a:t>Symptoms</a:t>
             </a:r>
             <a:r>
               <a:rPr lang="en-US" dirty="0"/>
-              <a:t>:  Coding early on for perceived efficiency, sacrificing good design, maintainability, and (often) even real-world efficiency.</a:t>
+              <a:t>:  You are adding code that is only intended to increase performance.  In self-review, you discover that your code is difficult to read or comprehend, and will be difficult for others to approach.</a:t>
             </a:r>
           </a:p>
           <a:p>
@@ -19800,11 +19985,11 @@
             </a:pPr>
             <a:r>
               <a:rPr lang="en-US" b="1" dirty="0"/>
-              <a:t>Symptoms</a:t>
+              <a:t>Discussion Point</a:t>
             </a:r>
             <a:r>
               <a:rPr lang="en-US" dirty="0"/>
-              <a:t>:  You are adding code that is only intended to increase performance.  In self-review, you discover that your code is difficult to read or comprehend, and will be difficult for others to approach.</a:t>
+              <a:t>:  Jackson’s Rules of Optimization</a:t>
             </a:r>
           </a:p>
           <a:p>
@@ -21475,7 +21660,7 @@
           <a:p>
             <a:r>
               <a:rPr lang="en-US" dirty="0"/>
-              <a:t>Bicycle Shed</a:t>
+              <a:t>Bike Shedding</a:t>
             </a:r>
           </a:p>
         </p:txBody>
@@ -22178,7 +22363,7 @@
             </a:r>
             <a:r>
               <a:rPr lang="en-US" dirty="0"/>
-              <a:t>:  Software is not a democracy. Designate a leader for each design project.  The leader should solicit any necessary input according to their leadership style, </a:t>
+              <a:t>:  Business is a meritocracy, not a democracy. Designate a leader for each design project.  The leader should solicit any necessary input according to their leadership style, </a:t>
             </a:r>
             <a:r>
               <a:rPr lang="en-US" i="1" dirty="0"/>
@@ -23034,7 +23219,7 @@
 <file path=ppt/theme/theme1.xml><?xml version="1.0" encoding="utf-8"?>
 <a:theme xmlns:a="http://schemas.openxmlformats.org/drawingml/2006/main" name="Facet">
   <a:themeElements>
-    <a:clrScheme name="Facet">
+    <a:clrScheme name="Yellow">
       <a:dk1>
         <a:sysClr val="windowText" lastClr="000000"/>
       </a:dk1>
@@ -23042,34 +23227,34 @@
         <a:sysClr val="window" lastClr="FFFFFF"/>
       </a:lt1>
       <a:dk2>
-        <a:srgbClr val="2C3C43"/>
+        <a:srgbClr val="39302A"/>
       </a:dk2>
       <a:lt2>
-        <a:srgbClr val="EBEBEB"/>
+        <a:srgbClr val="E5DEDB"/>
       </a:lt2>
       <a:accent1>
-        <a:srgbClr val="5FCBEF"/>
+        <a:srgbClr val="FFCA08"/>
       </a:accent1>
       <a:accent2>
-        <a:srgbClr val="2E83C3"/>
+        <a:srgbClr val="F8931D"/>
       </a:accent2>
       <a:accent3>
-        <a:srgbClr val="42D0A2"/>
+        <a:srgbClr val="CE8D3E"/>
       </a:accent3>
       <a:accent4>
-        <a:srgbClr val="2E946B"/>
+        <a:srgbClr val="EC7016"/>
       </a:accent4>
       <a:accent5>
-        <a:srgbClr val="42B051"/>
+        <a:srgbClr val="E64823"/>
       </a:accent5>
       <a:accent6>
-        <a:srgbClr val="96D141"/>
+        <a:srgbClr val="9C6A6A"/>
       </a:accent6>
       <a:hlink>
-        <a:srgbClr val="3FCDE7"/>
+        <a:srgbClr val="2998E3"/>
       </a:hlink>
       <a:folHlink>
-        <a:srgbClr val="A9D3E1"/>
+        <a:srgbClr val="7F723D"/>
       </a:folHlink>
     </a:clrScheme>
     <a:fontScheme name="Facet">
@@ -23282,7 +23467,7 @@
   <a:extraClrSchemeLst/>
   <a:extLst>
     <a:ext uri="{05A4C25C-085E-4340-85A3-A5531E510DB2}">
-      <thm15:themeFamily xmlns:thm15="http://schemas.microsoft.com/office/thememl/2012/main" name="Facet" id="{C0C680CD-088A-49FC-A102-D699147F32B2}" vid="{0B5AB586-D108-4FC1-8368-649FE654B894}"/>
+      <thm15:themeFamily xmlns:thm15="http://schemas.microsoft.com/office/thememl/2012/main" name="Facet" id="{C0C680CD-088A-49FC-A102-D699147F32B2}" vid="{8C59B386-999D-4CB6-B907-9F3997C027CC}"/>
     </a:ext>
   </a:extLst>
 </a:theme>

</xml_diff>